<commit_message>
Presentación mi parte acabada
</commit_message>
<xml_diff>
--- a/Documentacion/Presentación/Presentación de la aplicación.pptx
+++ b/Documentacion/Presentación/Presentación de la aplicación.pptx
@@ -5,7 +5,7 @@
     <p:sldMasterId id="2147483779" r:id="rId1"/>
   </p:sldMasterIdLst>
   <p:notesMasterIdLst>
-    <p:notesMasterId r:id="rId14"/>
+    <p:notesMasterId r:id="rId13"/>
   </p:notesMasterIdLst>
   <p:sldIdLst>
     <p:sldId id="256" r:id="rId2"/>
@@ -15,11 +15,10 @@
     <p:sldId id="263" r:id="rId6"/>
     <p:sldId id="268" r:id="rId7"/>
     <p:sldId id="266" r:id="rId8"/>
-    <p:sldId id="267" r:id="rId9"/>
-    <p:sldId id="264" r:id="rId10"/>
-    <p:sldId id="265" r:id="rId11"/>
-    <p:sldId id="260" r:id="rId12"/>
-    <p:sldId id="262" r:id="rId13"/>
+    <p:sldId id="264" r:id="rId9"/>
+    <p:sldId id="265" r:id="rId10"/>
+    <p:sldId id="260" r:id="rId11"/>
+    <p:sldId id="262" r:id="rId12"/>
   </p:sldIdLst>
   <p:sldSz cx="12192000" cy="6858000"/>
   <p:notesSz cx="6858000" cy="9144000"/>
@@ -520,6 +519,180 @@
           <a:lstStyle/>
           <a:p>
             <a:r>
+              <a:rPr lang="en-US" dirty="0"/>
+              <a:t>Good luck &lt;3 you can all do it!</a:t>
+            </a:r>
+          </a:p>
+        </p:txBody>
+      </p:sp>
+      <p:sp>
+        <p:nvSpPr>
+          <p:cNvPr id="4" name="Slide Number Placeholder 3"/>
+          <p:cNvSpPr>
+            <a:spLocks noGrp="1"/>
+          </p:cNvSpPr>
+          <p:nvPr>
+            <p:ph type="sldNum" sz="quarter" idx="10"/>
+          </p:nvPr>
+        </p:nvSpPr>
+        <p:spPr/>
+        <p:txBody>
+          <a:bodyPr/>
+          <a:lstStyle/>
+          <a:p>
+            <a:fld id="{DC5D3816-C870-4D57-B0F0-489AD15872E6}" type="slidenum">
+              <a:rPr lang="en-US" smtClean="0"/>
+              <a:t>1</a:t>
+            </a:fld>
+            <a:endParaRPr lang="en-US"/>
+          </a:p>
+        </p:txBody>
+      </p:sp>
+    </p:spTree>
+    <p:extLst>
+      <p:ext uri="{BB962C8B-B14F-4D97-AF65-F5344CB8AC3E}">
+        <p14:creationId xmlns:p14="http://schemas.microsoft.com/office/powerpoint/2010/main" val="2396794233"/>
+      </p:ext>
+    </p:extLst>
+  </p:cSld>
+  <p:clrMapOvr>
+    <a:masterClrMapping/>
+  </p:clrMapOvr>
+</p:notes>
+</file>
+
+<file path=ppt/notesSlides/notesSlide2.xml><?xml version="1.0" encoding="utf-8"?>
+<p:notes xmlns:a="http://schemas.openxmlformats.org/drawingml/2006/main" xmlns:r="http://schemas.openxmlformats.org/officeDocument/2006/relationships" xmlns:p="http://schemas.openxmlformats.org/presentationml/2006/main">
+  <p:cSld>
+    <p:spTree>
+      <p:nvGrpSpPr>
+        <p:cNvPr id="1" name=""/>
+        <p:cNvGrpSpPr/>
+        <p:nvPr/>
+      </p:nvGrpSpPr>
+      <p:grpSpPr>
+        <a:xfrm>
+          <a:off x="0" y="0"/>
+          <a:ext cx="0" cy="0"/>
+          <a:chOff x="0" y="0"/>
+          <a:chExt cx="0" cy="0"/>
+        </a:xfrm>
+      </p:grpSpPr>
+      <p:sp>
+        <p:nvSpPr>
+          <p:cNvPr id="2" name="Slide Image Placeholder 1"/>
+          <p:cNvSpPr>
+            <a:spLocks noGrp="1" noRot="1" noChangeAspect="1"/>
+          </p:cNvSpPr>
+          <p:nvPr>
+            <p:ph type="sldImg"/>
+          </p:nvPr>
+        </p:nvSpPr>
+        <p:spPr/>
+      </p:sp>
+      <p:sp>
+        <p:nvSpPr>
+          <p:cNvPr id="3" name="Notes Placeholder 2"/>
+          <p:cNvSpPr>
+            <a:spLocks noGrp="1"/>
+          </p:cNvSpPr>
+          <p:nvPr>
+            <p:ph type="body" idx="1"/>
+          </p:nvPr>
+        </p:nvSpPr>
+        <p:spPr/>
+        <p:txBody>
+          <a:bodyPr/>
+          <a:lstStyle/>
+          <a:p>
+            <a:r>
+              <a:rPr lang="en-US" dirty="0"/>
+              <a:t>-DON’T FUCKING TALK TOO MUCH</a:t>
+            </a:r>
+          </a:p>
+        </p:txBody>
+      </p:sp>
+      <p:sp>
+        <p:nvSpPr>
+          <p:cNvPr id="4" name="Slide Number Placeholder 3"/>
+          <p:cNvSpPr>
+            <a:spLocks noGrp="1"/>
+          </p:cNvSpPr>
+          <p:nvPr>
+            <p:ph type="sldNum" sz="quarter" idx="10"/>
+          </p:nvPr>
+        </p:nvSpPr>
+        <p:spPr/>
+        <p:txBody>
+          <a:bodyPr/>
+          <a:lstStyle/>
+          <a:p>
+            <a:fld id="{DC5D3816-C870-4D57-B0F0-489AD15872E6}" type="slidenum">
+              <a:rPr lang="en-US" smtClean="0"/>
+              <a:t>2</a:t>
+            </a:fld>
+            <a:endParaRPr lang="en-US"/>
+          </a:p>
+        </p:txBody>
+      </p:sp>
+    </p:spTree>
+    <p:extLst>
+      <p:ext uri="{BB962C8B-B14F-4D97-AF65-F5344CB8AC3E}">
+        <p14:creationId xmlns:p14="http://schemas.microsoft.com/office/powerpoint/2010/main" val="435775343"/>
+      </p:ext>
+    </p:extLst>
+  </p:cSld>
+  <p:clrMapOvr>
+    <a:masterClrMapping/>
+  </p:clrMapOvr>
+</p:notes>
+</file>
+
+<file path=ppt/notesSlides/notesSlide3.xml><?xml version="1.0" encoding="utf-8"?>
+<p:notes xmlns:a="http://schemas.openxmlformats.org/drawingml/2006/main" xmlns:r="http://schemas.openxmlformats.org/officeDocument/2006/relationships" xmlns:p="http://schemas.openxmlformats.org/presentationml/2006/main">
+  <p:cSld>
+    <p:spTree>
+      <p:nvGrpSpPr>
+        <p:cNvPr id="1" name=""/>
+        <p:cNvGrpSpPr/>
+        <p:nvPr/>
+      </p:nvGrpSpPr>
+      <p:grpSpPr>
+        <a:xfrm>
+          <a:off x="0" y="0"/>
+          <a:ext cx="0" cy="0"/>
+          <a:chOff x="0" y="0"/>
+          <a:chExt cx="0" cy="0"/>
+        </a:xfrm>
+      </p:grpSpPr>
+      <p:sp>
+        <p:nvSpPr>
+          <p:cNvPr id="2" name="Slide Image Placeholder 1"/>
+          <p:cNvSpPr>
+            <a:spLocks noGrp="1" noRot="1" noChangeAspect="1"/>
+          </p:cNvSpPr>
+          <p:nvPr>
+            <p:ph type="sldImg"/>
+          </p:nvPr>
+        </p:nvSpPr>
+        <p:spPr/>
+      </p:sp>
+      <p:sp>
+        <p:nvSpPr>
+          <p:cNvPr id="3" name="Notes Placeholder 2"/>
+          <p:cNvSpPr>
+            <a:spLocks noGrp="1"/>
+          </p:cNvSpPr>
+          <p:nvPr>
+            <p:ph type="body" idx="1"/>
+          </p:nvPr>
+        </p:nvSpPr>
+        <p:spPr/>
+        <p:txBody>
+          <a:bodyPr/>
+          <a:lstStyle/>
+          <a:p>
+            <a:r>
               <a:rPr lang="en-US" dirty="0" err="1"/>
               <a:t>Vamos</a:t>
             </a:r>
@@ -586,6 +759,304 @@
     <p:extLst>
       <p:ext uri="{BB962C8B-B14F-4D97-AF65-F5344CB8AC3E}">
         <p14:creationId xmlns:p14="http://schemas.microsoft.com/office/powerpoint/2010/main" val="2421817529"/>
+      </p:ext>
+    </p:extLst>
+  </p:cSld>
+  <p:clrMapOvr>
+    <a:masterClrMapping/>
+  </p:clrMapOvr>
+</p:notes>
+</file>
+
+<file path=ppt/notesSlides/notesSlide4.xml><?xml version="1.0" encoding="utf-8"?>
+<p:notes xmlns:a="http://schemas.openxmlformats.org/drawingml/2006/main" xmlns:r="http://schemas.openxmlformats.org/officeDocument/2006/relationships" xmlns:p="http://schemas.openxmlformats.org/presentationml/2006/main">
+  <p:cSld>
+    <p:spTree>
+      <p:nvGrpSpPr>
+        <p:cNvPr id="1" name=""/>
+        <p:cNvGrpSpPr/>
+        <p:nvPr/>
+      </p:nvGrpSpPr>
+      <p:grpSpPr>
+        <a:xfrm>
+          <a:off x="0" y="0"/>
+          <a:ext cx="0" cy="0"/>
+          <a:chOff x="0" y="0"/>
+          <a:chExt cx="0" cy="0"/>
+        </a:xfrm>
+      </p:grpSpPr>
+      <p:sp>
+        <p:nvSpPr>
+          <p:cNvPr id="2" name="Slide Image Placeholder 1"/>
+          <p:cNvSpPr>
+            <a:spLocks noGrp="1" noRot="1" noChangeAspect="1"/>
+          </p:cNvSpPr>
+          <p:nvPr>
+            <p:ph type="sldImg"/>
+          </p:nvPr>
+        </p:nvSpPr>
+        <p:spPr/>
+      </p:sp>
+      <p:sp>
+        <p:nvSpPr>
+          <p:cNvPr id="3" name="Notes Placeholder 2"/>
+          <p:cNvSpPr>
+            <a:spLocks noGrp="1"/>
+          </p:cNvSpPr>
+          <p:nvPr>
+            <p:ph type="body" idx="1"/>
+          </p:nvPr>
+        </p:nvSpPr>
+        <p:spPr/>
+        <p:txBody>
+          <a:bodyPr/>
+          <a:lstStyle/>
+          <a:p>
+            <a:r>
+              <a:rPr lang="en-US" dirty="0"/>
+              <a:t>-XML no era igual al principio que al final</a:t>
+            </a:r>
+          </a:p>
+        </p:txBody>
+      </p:sp>
+      <p:sp>
+        <p:nvSpPr>
+          <p:cNvPr id="4" name="Slide Number Placeholder 3"/>
+          <p:cNvSpPr>
+            <a:spLocks noGrp="1"/>
+          </p:cNvSpPr>
+          <p:nvPr>
+            <p:ph type="sldNum" sz="quarter" idx="10"/>
+          </p:nvPr>
+        </p:nvSpPr>
+        <p:spPr/>
+        <p:txBody>
+          <a:bodyPr/>
+          <a:lstStyle/>
+          <a:p>
+            <a:fld id="{DC5D3816-C870-4D57-B0F0-489AD15872E6}" type="slidenum">
+              <a:rPr lang="en-US" smtClean="0"/>
+              <a:t>6</a:t>
+            </a:fld>
+            <a:endParaRPr lang="en-US"/>
+          </a:p>
+        </p:txBody>
+      </p:sp>
+    </p:spTree>
+    <p:extLst>
+      <p:ext uri="{BB962C8B-B14F-4D97-AF65-F5344CB8AC3E}">
+        <p14:creationId xmlns:p14="http://schemas.microsoft.com/office/powerpoint/2010/main" val="1234524813"/>
+      </p:ext>
+    </p:extLst>
+  </p:cSld>
+  <p:clrMapOvr>
+    <a:masterClrMapping/>
+  </p:clrMapOvr>
+</p:notes>
+</file>
+
+<file path=ppt/notesSlides/notesSlide5.xml><?xml version="1.0" encoding="utf-8"?>
+<p:notes xmlns:a="http://schemas.openxmlformats.org/drawingml/2006/main" xmlns:r="http://schemas.openxmlformats.org/officeDocument/2006/relationships" xmlns:p="http://schemas.openxmlformats.org/presentationml/2006/main">
+  <p:cSld>
+    <p:spTree>
+      <p:nvGrpSpPr>
+        <p:cNvPr id="1" name=""/>
+        <p:cNvGrpSpPr/>
+        <p:nvPr/>
+      </p:nvGrpSpPr>
+      <p:grpSpPr>
+        <a:xfrm>
+          <a:off x="0" y="0"/>
+          <a:ext cx="0" cy="0"/>
+          <a:chOff x="0" y="0"/>
+          <a:chExt cx="0" cy="0"/>
+        </a:xfrm>
+      </p:grpSpPr>
+      <p:sp>
+        <p:nvSpPr>
+          <p:cNvPr id="2" name="Slide Image Placeholder 1"/>
+          <p:cNvSpPr>
+            <a:spLocks noGrp="1" noRot="1" noChangeAspect="1"/>
+          </p:cNvSpPr>
+          <p:nvPr>
+            <p:ph type="sldImg"/>
+          </p:nvPr>
+        </p:nvSpPr>
+        <p:spPr/>
+      </p:sp>
+      <p:sp>
+        <p:nvSpPr>
+          <p:cNvPr id="3" name="Notes Placeholder 2"/>
+          <p:cNvSpPr>
+            <a:spLocks noGrp="1"/>
+          </p:cNvSpPr>
+          <p:nvPr>
+            <p:ph type="body" idx="1"/>
+          </p:nvPr>
+        </p:nvSpPr>
+        <p:spPr/>
+        <p:txBody>
+          <a:bodyPr/>
+          <a:lstStyle/>
+          <a:p>
+            <a:r>
+              <a:rPr lang="es-ES" sz="1200" b="0" i="0" u="none" strike="noStrike" kern="1200" dirty="0">
+                <a:solidFill>
+                  <a:schemeClr val="tx1"/>
+                </a:solidFill>
+                <a:effectLst/>
+                <a:latin typeface="+mn-lt"/>
+                <a:ea typeface="+mn-ea"/>
+                <a:cs typeface="+mn-cs"/>
+              </a:rPr>
+              <a:t>-Lógica del script</a:t>
+            </a:r>
+          </a:p>
+          <a:p>
+            <a:r>
+              <a:rPr lang="es-ES" sz="1200" b="0" i="0" u="none" strike="noStrike" kern="1200" dirty="0">
+                <a:solidFill>
+                  <a:schemeClr val="tx1"/>
+                </a:solidFill>
+                <a:effectLst/>
+                <a:latin typeface="+mn-lt"/>
+                <a:ea typeface="+mn-ea"/>
+                <a:cs typeface="+mn-cs"/>
+              </a:rPr>
+              <a:t>-Problema con el for </a:t>
+            </a:r>
+          </a:p>
+          <a:p>
+            <a:r>
+              <a:rPr lang="es-ES" sz="1200" b="0" i="0" u="none" strike="noStrike" kern="1200" dirty="0">
+                <a:solidFill>
+                  <a:schemeClr val="tx1"/>
+                </a:solidFill>
+                <a:effectLst/>
+                <a:latin typeface="+mn-lt"/>
+                <a:ea typeface="+mn-ea"/>
+                <a:cs typeface="+mn-cs"/>
+              </a:rPr>
+              <a:t>-Variable que elimina el log cuando hay conexión.</a:t>
+            </a:r>
+            <a:endParaRPr lang="en-US" dirty="0"/>
+          </a:p>
+        </p:txBody>
+      </p:sp>
+      <p:sp>
+        <p:nvSpPr>
+          <p:cNvPr id="4" name="Slide Number Placeholder 3"/>
+          <p:cNvSpPr>
+            <a:spLocks noGrp="1"/>
+          </p:cNvSpPr>
+          <p:nvPr>
+            <p:ph type="sldNum" sz="quarter" idx="10"/>
+          </p:nvPr>
+        </p:nvSpPr>
+        <p:spPr/>
+        <p:txBody>
+          <a:bodyPr/>
+          <a:lstStyle/>
+          <a:p>
+            <a:fld id="{DC5D3816-C870-4D57-B0F0-489AD15872E6}" type="slidenum">
+              <a:rPr lang="en-US" smtClean="0"/>
+              <a:t>8</a:t>
+            </a:fld>
+            <a:endParaRPr lang="en-US"/>
+          </a:p>
+        </p:txBody>
+      </p:sp>
+    </p:spTree>
+    <p:extLst>
+      <p:ext uri="{BB962C8B-B14F-4D97-AF65-F5344CB8AC3E}">
+        <p14:creationId xmlns:p14="http://schemas.microsoft.com/office/powerpoint/2010/main" val="2437599104"/>
+      </p:ext>
+    </p:extLst>
+  </p:cSld>
+  <p:clrMapOvr>
+    <a:masterClrMapping/>
+  </p:clrMapOvr>
+</p:notes>
+</file>
+
+<file path=ppt/notesSlides/notesSlide6.xml><?xml version="1.0" encoding="utf-8"?>
+<p:notes xmlns:a="http://schemas.openxmlformats.org/drawingml/2006/main" xmlns:r="http://schemas.openxmlformats.org/officeDocument/2006/relationships" xmlns:p="http://schemas.openxmlformats.org/presentationml/2006/main">
+  <p:cSld>
+    <p:spTree>
+      <p:nvGrpSpPr>
+        <p:cNvPr id="1" name=""/>
+        <p:cNvGrpSpPr/>
+        <p:nvPr/>
+      </p:nvGrpSpPr>
+      <p:grpSpPr>
+        <a:xfrm>
+          <a:off x="0" y="0"/>
+          <a:ext cx="0" cy="0"/>
+          <a:chOff x="0" y="0"/>
+          <a:chExt cx="0" cy="0"/>
+        </a:xfrm>
+      </p:grpSpPr>
+      <p:sp>
+        <p:nvSpPr>
+          <p:cNvPr id="2" name="Slide Image Placeholder 1"/>
+          <p:cNvSpPr>
+            <a:spLocks noGrp="1" noRot="1" noChangeAspect="1"/>
+          </p:cNvSpPr>
+          <p:nvPr>
+            <p:ph type="sldImg"/>
+          </p:nvPr>
+        </p:nvSpPr>
+        <p:spPr/>
+      </p:sp>
+      <p:sp>
+        <p:nvSpPr>
+          <p:cNvPr id="3" name="Notes Placeholder 2"/>
+          <p:cNvSpPr>
+            <a:spLocks noGrp="1"/>
+          </p:cNvSpPr>
+          <p:nvPr>
+            <p:ph type="body" idx="1"/>
+          </p:nvPr>
+        </p:nvSpPr>
+        <p:spPr/>
+        <p:txBody>
+          <a:bodyPr/>
+          <a:lstStyle/>
+          <a:p>
+            <a:r>
+              <a:rPr lang="en-US" dirty="0"/>
+              <a:t>-ORDEN DE LA DEMO</a:t>
+            </a:r>
+          </a:p>
+        </p:txBody>
+      </p:sp>
+      <p:sp>
+        <p:nvSpPr>
+          <p:cNvPr id="4" name="Slide Number Placeholder 3"/>
+          <p:cNvSpPr>
+            <a:spLocks noGrp="1"/>
+          </p:cNvSpPr>
+          <p:nvPr>
+            <p:ph type="sldNum" sz="quarter" idx="10"/>
+          </p:nvPr>
+        </p:nvSpPr>
+        <p:spPr/>
+        <p:txBody>
+          <a:bodyPr/>
+          <a:lstStyle/>
+          <a:p>
+            <a:fld id="{DC5D3816-C870-4D57-B0F0-489AD15872E6}" type="slidenum">
+              <a:rPr lang="en-US" smtClean="0"/>
+              <a:t>11</a:t>
+            </a:fld>
+            <a:endParaRPr lang="en-US"/>
+          </a:p>
+        </p:txBody>
+      </p:sp>
+    </p:spTree>
+    <p:extLst>
+      <p:ext uri="{BB962C8B-B14F-4D97-AF65-F5344CB8AC3E}">
+        <p14:creationId xmlns:p14="http://schemas.microsoft.com/office/powerpoint/2010/main" val="1384659104"/>
       </p:ext>
     </p:extLst>
   </p:cSld>
@@ -12976,7 +13447,7 @@
           <p:nvPr/>
         </p:nvPicPr>
         <p:blipFill rotWithShape="1">
-          <a:blip r:embed="rId2">
+          <a:blip r:embed="rId3">
             <a:extLst>
               <a:ext uri="{28A0092B-C50C-407E-A947-70E740481C1C}">
                 <a14:useLocalDpi xmlns:a14="http://schemas.microsoft.com/office/drawing/2010/main" val="0"/>
@@ -13010,90 +13481,6 @@
 </file>
 
 <file path=ppt/slides/slide10.xml><?xml version="1.0" encoding="utf-8"?>
-<p:sld xmlns:a="http://schemas.openxmlformats.org/drawingml/2006/main" xmlns:r="http://schemas.openxmlformats.org/officeDocument/2006/relationships" xmlns:p="http://schemas.openxmlformats.org/presentationml/2006/main">
-  <p:cSld>
-    <p:spTree>
-      <p:nvGrpSpPr>
-        <p:cNvPr id="1" name=""/>
-        <p:cNvGrpSpPr/>
-        <p:nvPr/>
-      </p:nvGrpSpPr>
-      <p:grpSpPr>
-        <a:xfrm>
-          <a:off x="0" y="0"/>
-          <a:ext cx="0" cy="0"/>
-          <a:chOff x="0" y="0"/>
-          <a:chExt cx="0" cy="0"/>
-        </a:xfrm>
-      </p:grpSpPr>
-      <p:sp>
-        <p:nvSpPr>
-          <p:cNvPr id="2" name="Title 1">
-            <a:extLst>
-              <a:ext uri="{FF2B5EF4-FFF2-40B4-BE49-F238E27FC236}">
-                <a16:creationId xmlns:a16="http://schemas.microsoft.com/office/drawing/2014/main" id="{E39C28E2-9194-40CD-BFAE-7389B099D8AF}"/>
-              </a:ext>
-            </a:extLst>
-          </p:cNvPr>
-          <p:cNvSpPr>
-            <a:spLocks noGrp="1"/>
-          </p:cNvSpPr>
-          <p:nvPr>
-            <p:ph type="title"/>
-          </p:nvPr>
-        </p:nvSpPr>
-        <p:spPr/>
-        <p:txBody>
-          <a:bodyPr/>
-          <a:lstStyle/>
-          <a:p>
-            <a:r>
-              <a:rPr lang="es-ES" dirty="0" err="1"/>
-              <a:t>Wordpress</a:t>
-            </a:r>
-            <a:endParaRPr lang="en-US" dirty="0"/>
-          </a:p>
-        </p:txBody>
-      </p:sp>
-      <p:sp>
-        <p:nvSpPr>
-          <p:cNvPr id="3" name="Content Placeholder 2">
-            <a:extLst>
-              <a:ext uri="{FF2B5EF4-FFF2-40B4-BE49-F238E27FC236}">
-                <a16:creationId xmlns:a16="http://schemas.microsoft.com/office/drawing/2014/main" id="{DA79BC87-278A-4F1C-BFDE-928356348413}"/>
-              </a:ext>
-            </a:extLst>
-          </p:cNvPr>
-          <p:cNvSpPr>
-            <a:spLocks noGrp="1"/>
-          </p:cNvSpPr>
-          <p:nvPr>
-            <p:ph idx="1"/>
-          </p:nvPr>
-        </p:nvSpPr>
-        <p:spPr/>
-        <p:txBody>
-          <a:bodyPr/>
-          <a:lstStyle/>
-          <a:p>
-            <a:endParaRPr lang="en-US"/>
-          </a:p>
-        </p:txBody>
-      </p:sp>
-    </p:spTree>
-    <p:extLst>
-      <p:ext uri="{BB962C8B-B14F-4D97-AF65-F5344CB8AC3E}">
-        <p14:creationId xmlns:p14="http://schemas.microsoft.com/office/powerpoint/2010/main" val="3767124708"/>
-      </p:ext>
-    </p:extLst>
-  </p:cSld>
-  <p:clrMapOvr>
-    <a:masterClrMapping/>
-  </p:clrMapOvr>
-</p:sld>
-</file>
-
-<file path=ppt/slides/slide11.xml><?xml version="1.0" encoding="utf-8"?>
 <p:sld xmlns:a="http://schemas.openxmlformats.org/drawingml/2006/main" xmlns:r="http://schemas.openxmlformats.org/officeDocument/2006/relationships" xmlns:p="http://schemas.openxmlformats.org/presentationml/2006/main">
   <p:cSld>
     <p:bg>
@@ -13298,10 +13685,89 @@
   <p:clrMapOvr>
     <a:masterClrMapping/>
   </p:clrMapOvr>
+  <p:timing>
+    <p:tnLst>
+      <p:par>
+        <p:cTn id="1" dur="indefinite" restart="never" nodeType="tmRoot">
+          <p:childTnLst>
+            <p:seq concurrent="1" nextAc="seek">
+              <p:cTn id="2" dur="indefinite" nodeType="mainSeq">
+                <p:childTnLst>
+                  <p:par>
+                    <p:cTn id="3" fill="hold">
+                      <p:stCondLst>
+                        <p:cond delay="indefinite"/>
+                      </p:stCondLst>
+                      <p:childTnLst>
+                        <p:par>
+                          <p:cTn id="4" fill="hold">
+                            <p:stCondLst>
+                              <p:cond delay="0"/>
+                            </p:stCondLst>
+                            <p:childTnLst>
+                              <p:par>
+                                <p:cTn id="5" presetID="1" presetClass="entr" presetSubtype="0" fill="hold" nodeType="clickEffect">
+                                  <p:stCondLst>
+                                    <p:cond delay="0"/>
+                                  </p:stCondLst>
+                                  <p:childTnLst>
+                                    <p:set>
+                                      <p:cBhvr>
+                                        <p:cTn id="6" dur="1" fill="hold">
+                                          <p:stCondLst>
+                                            <p:cond delay="0"/>
+                                          </p:stCondLst>
+                                        </p:cTn>
+                                        <p:tgtEl>
+                                          <p:spTgt spid="3">
+                                            <p:txEl>
+                                              <p:pRg st="1" end="1"/>
+                                            </p:txEl>
+                                          </p:spTgt>
+                                        </p:tgtEl>
+                                        <p:attrNameLst>
+                                          <p:attrName>style.visibility</p:attrName>
+                                        </p:attrNameLst>
+                                      </p:cBhvr>
+                                      <p:to>
+                                        <p:strVal val="visible"/>
+                                      </p:to>
+                                    </p:set>
+                                  </p:childTnLst>
+                                </p:cTn>
+                              </p:par>
+                            </p:childTnLst>
+                          </p:cTn>
+                        </p:par>
+                      </p:childTnLst>
+                    </p:cTn>
+                  </p:par>
+                </p:childTnLst>
+              </p:cTn>
+              <p:prevCondLst>
+                <p:cond evt="onPrev" delay="0">
+                  <p:tgtEl>
+                    <p:sldTgt/>
+                  </p:tgtEl>
+                </p:cond>
+              </p:prevCondLst>
+              <p:nextCondLst>
+                <p:cond evt="onNext" delay="0">
+                  <p:tgtEl>
+                    <p:sldTgt/>
+                  </p:tgtEl>
+                </p:cond>
+              </p:nextCondLst>
+            </p:seq>
+          </p:childTnLst>
+        </p:cTn>
+      </p:par>
+    </p:tnLst>
+  </p:timing>
 </p:sld>
 </file>
 
-<file path=ppt/slides/slide12.xml><?xml version="1.0" encoding="utf-8"?>
+<file path=ppt/slides/slide11.xml><?xml version="1.0" encoding="utf-8"?>
 <p:sld xmlns:a="http://schemas.openxmlformats.org/drawingml/2006/main" xmlns:r="http://schemas.openxmlformats.org/officeDocument/2006/relationships" xmlns:p="http://schemas.openxmlformats.org/presentationml/2006/main">
   <p:cSld>
     <p:spTree>
@@ -13368,7 +13834,7 @@
           <a:bodyPr/>
           <a:lstStyle/>
           <a:p>
-            <a:endParaRPr lang="en-US"/>
+            <a:endParaRPr lang="en-US" dirty="0"/>
           </a:p>
         </p:txBody>
       </p:sp>
@@ -13494,6 +13960,147 @@
   <p:clrMapOvr>
     <a:masterClrMapping/>
   </p:clrMapOvr>
+  <p:timing>
+    <p:tnLst>
+      <p:par>
+        <p:cTn id="1" dur="indefinite" restart="never" nodeType="tmRoot">
+          <p:childTnLst>
+            <p:seq concurrent="1" nextAc="seek">
+              <p:cTn id="2" dur="indefinite" nodeType="mainSeq">
+                <p:childTnLst>
+                  <p:par>
+                    <p:cTn id="3" fill="hold">
+                      <p:stCondLst>
+                        <p:cond delay="indefinite"/>
+                      </p:stCondLst>
+                      <p:childTnLst>
+                        <p:par>
+                          <p:cTn id="4" fill="hold">
+                            <p:stCondLst>
+                              <p:cond delay="0"/>
+                            </p:stCondLst>
+                            <p:childTnLst>
+                              <p:par>
+                                <p:cTn id="5" presetID="1" presetClass="entr" presetSubtype="0" fill="hold" nodeType="clickEffect">
+                                  <p:stCondLst>
+                                    <p:cond delay="0"/>
+                                  </p:stCondLst>
+                                  <p:childTnLst>
+                                    <p:set>
+                                      <p:cBhvr>
+                                        <p:cTn id="6" dur="1" fill="hold">
+                                          <p:stCondLst>
+                                            <p:cond delay="0"/>
+                                          </p:stCondLst>
+                                        </p:cTn>
+                                        <p:tgtEl>
+                                          <p:spTgt spid="3">
+                                            <p:txEl>
+                                              <p:pRg st="1" end="1"/>
+                                            </p:txEl>
+                                          </p:spTgt>
+                                        </p:tgtEl>
+                                        <p:attrNameLst>
+                                          <p:attrName>style.visibility</p:attrName>
+                                        </p:attrNameLst>
+                                      </p:cBhvr>
+                                      <p:to>
+                                        <p:strVal val="visible"/>
+                                      </p:to>
+                                    </p:set>
+                                  </p:childTnLst>
+                                </p:cTn>
+                              </p:par>
+                              <p:par>
+                                <p:cTn id="7" presetID="1" presetClass="entr" presetSubtype="0" fill="hold" nodeType="withEffect">
+                                  <p:stCondLst>
+                                    <p:cond delay="0"/>
+                                  </p:stCondLst>
+                                  <p:childTnLst>
+                                    <p:set>
+                                      <p:cBhvr>
+                                        <p:cTn id="8" dur="1" fill="hold">
+                                          <p:stCondLst>
+                                            <p:cond delay="0"/>
+                                          </p:stCondLst>
+                                        </p:cTn>
+                                        <p:tgtEl>
+                                          <p:spTgt spid="3">
+                                            <p:txEl>
+                                              <p:pRg st="2" end="2"/>
+                                            </p:txEl>
+                                          </p:spTgt>
+                                        </p:tgtEl>
+                                        <p:attrNameLst>
+                                          <p:attrName>style.visibility</p:attrName>
+                                        </p:attrNameLst>
+                                      </p:cBhvr>
+                                      <p:to>
+                                        <p:strVal val="visible"/>
+                                      </p:to>
+                                    </p:set>
+                                  </p:childTnLst>
+                                </p:cTn>
+                              </p:par>
+                              <p:par>
+                                <p:cTn id="9" presetID="1" presetClass="entr" presetSubtype="0" fill="hold" nodeType="withEffect">
+                                  <p:stCondLst>
+                                    <p:cond delay="0"/>
+                                  </p:stCondLst>
+                                  <p:childTnLst>
+                                    <p:set>
+                                      <p:cBhvr>
+                                        <p:cTn id="10" dur="1" fill="hold">
+                                          <p:stCondLst>
+                                            <p:cond delay="0"/>
+                                          </p:stCondLst>
+                                        </p:cTn>
+                                        <p:tgtEl>
+                                          <p:spTgt spid="3">
+                                            <p:txEl>
+                                              <p:pRg st="3" end="3"/>
+                                            </p:txEl>
+                                          </p:spTgt>
+                                        </p:tgtEl>
+                                        <p:attrNameLst>
+                                          <p:attrName>style.visibility</p:attrName>
+                                        </p:attrNameLst>
+                                      </p:cBhvr>
+                                      <p:to>
+                                        <p:strVal val="visible"/>
+                                      </p:to>
+                                    </p:set>
+                                  </p:childTnLst>
+                                </p:cTn>
+                              </p:par>
+                            </p:childTnLst>
+                          </p:cTn>
+                        </p:par>
+                      </p:childTnLst>
+                    </p:cTn>
+                  </p:par>
+                </p:childTnLst>
+              </p:cTn>
+              <p:prevCondLst>
+                <p:cond evt="onPrev" delay="0">
+                  <p:tgtEl>
+                    <p:sldTgt/>
+                  </p:tgtEl>
+                </p:cond>
+              </p:prevCondLst>
+              <p:nextCondLst>
+                <p:cond evt="onNext" delay="0">
+                  <p:tgtEl>
+                    <p:sldTgt/>
+                  </p:tgtEl>
+                </p:cond>
+              </p:nextCondLst>
+            </p:seq>
+          </p:childTnLst>
+        </p:cTn>
+      </p:par>
+    </p:tnLst>
+  </p:timing>
 </p:sld>
 </file>
 
@@ -19314,7 +19921,7 @@
           <p:nvPr/>
         </p:nvPicPr>
         <p:blipFill rotWithShape="1">
-          <a:blip r:embed="rId2"/>
+          <a:blip r:embed="rId3"/>
           <a:srcRect b="49439"/>
           <a:stretch/>
         </p:blipFill>
@@ -19418,7 +20025,7 @@
         </p:blipFill>
         <p:spPr>
           <a:xfrm>
-            <a:off x="3433299" y="1878248"/>
+            <a:off x="1141413" y="1878248"/>
             <a:ext cx="5325401" cy="4361234"/>
           </a:xfrm>
         </p:spPr>
@@ -19437,106 +20044,6 @@
 </file>
 
 <file path=ppt/slides/slide8.xml><?xml version="1.0" encoding="utf-8"?>
-<p:sld xmlns:a="http://schemas.openxmlformats.org/drawingml/2006/main" xmlns:r="http://schemas.openxmlformats.org/officeDocument/2006/relationships" xmlns:p="http://schemas.openxmlformats.org/presentationml/2006/main">
-  <p:cSld>
-    <p:spTree>
-      <p:nvGrpSpPr>
-        <p:cNvPr id="1" name=""/>
-        <p:cNvGrpSpPr/>
-        <p:nvPr/>
-      </p:nvGrpSpPr>
-      <p:grpSpPr>
-        <a:xfrm>
-          <a:off x="0" y="0"/>
-          <a:ext cx="0" cy="0"/>
-          <a:chOff x="0" y="0"/>
-          <a:chExt cx="0" cy="0"/>
-        </a:xfrm>
-      </p:grpSpPr>
-      <p:sp>
-        <p:nvSpPr>
-          <p:cNvPr id="2" name="Title 1">
-            <a:extLst>
-              <a:ext uri="{FF2B5EF4-FFF2-40B4-BE49-F238E27FC236}">
-                <a16:creationId xmlns:a16="http://schemas.microsoft.com/office/drawing/2014/main" id="{66E92816-AC58-4F5A-8689-95C210748170}"/>
-              </a:ext>
-            </a:extLst>
-          </p:cNvPr>
-          <p:cNvSpPr>
-            <a:spLocks noGrp="1"/>
-          </p:cNvSpPr>
-          <p:nvPr>
-            <p:ph type="title"/>
-          </p:nvPr>
-        </p:nvSpPr>
-        <p:spPr/>
-        <p:txBody>
-          <a:bodyPr/>
-          <a:lstStyle/>
-          <a:p>
-            <a:r>
-              <a:rPr lang="es-ES" dirty="0"/>
-              <a:t>Problemas del planteamiento</a:t>
-            </a:r>
-            <a:endParaRPr lang="en-US" dirty="0"/>
-          </a:p>
-        </p:txBody>
-      </p:sp>
-      <p:sp>
-        <p:nvSpPr>
-          <p:cNvPr id="3" name="Content Placeholder 2">
-            <a:extLst>
-              <a:ext uri="{FF2B5EF4-FFF2-40B4-BE49-F238E27FC236}">
-                <a16:creationId xmlns:a16="http://schemas.microsoft.com/office/drawing/2014/main" id="{52C3B2CD-A099-445E-A281-51FEEC1BD46F}"/>
-              </a:ext>
-            </a:extLst>
-          </p:cNvPr>
-          <p:cNvSpPr>
-            <a:spLocks noGrp="1"/>
-          </p:cNvSpPr>
-          <p:nvPr>
-            <p:ph idx="1"/>
-          </p:nvPr>
-        </p:nvSpPr>
-        <p:spPr/>
-        <p:txBody>
-          <a:bodyPr/>
-          <a:lstStyle/>
-          <a:p>
-            <a:r>
-              <a:rPr lang="es-ES" dirty="0"/>
-              <a:t>La tabla mutaba</a:t>
-            </a:r>
-          </a:p>
-          <a:p>
-            <a:r>
-              <a:rPr lang="es-ES" dirty="0"/>
-              <a:t>El XML no era el más adecuado</a:t>
-            </a:r>
-          </a:p>
-          <a:p>
-            <a:r>
-              <a:rPr lang="es-ES" dirty="0"/>
-              <a:t>Estructura de la base de datos</a:t>
-            </a:r>
-            <a:endParaRPr lang="en-US" dirty="0"/>
-          </a:p>
-        </p:txBody>
-      </p:sp>
-    </p:spTree>
-    <p:extLst>
-      <p:ext uri="{BB962C8B-B14F-4D97-AF65-F5344CB8AC3E}">
-        <p14:creationId xmlns:p14="http://schemas.microsoft.com/office/powerpoint/2010/main" val="524027734"/>
-      </p:ext>
-    </p:extLst>
-  </p:cSld>
-  <p:clrMapOvr>
-    <a:masterClrMapping/>
-  </p:clrMapOvr>
-</p:sld>
-</file>
-
-<file path=ppt/slides/slide9.xml><?xml version="1.0" encoding="utf-8"?>
 <p:sld xmlns:a="http://schemas.openxmlformats.org/drawingml/2006/main" xmlns:r="http://schemas.openxmlformats.org/officeDocument/2006/relationships" xmlns:p="http://schemas.openxmlformats.org/presentationml/2006/main">
   <p:cSld>
     <p:spTree>
@@ -19607,10 +20114,302 @@
           </a:p>
         </p:txBody>
       </p:sp>
+      <p:pic>
+        <p:nvPicPr>
+          <p:cNvPr id="4" name="Picture 3">
+            <a:extLst>
+              <a:ext uri="{FF2B5EF4-FFF2-40B4-BE49-F238E27FC236}">
+                <a16:creationId xmlns:a16="http://schemas.microsoft.com/office/drawing/2014/main" id="{9602537A-E76A-4F48-B409-BFA6EA143277}"/>
+              </a:ext>
+            </a:extLst>
+          </p:cNvPr>
+          <p:cNvPicPr>
+            <a:picLocks noChangeAspect="1"/>
+          </p:cNvPicPr>
+          <p:nvPr/>
+        </p:nvPicPr>
+        <p:blipFill>
+          <a:blip r:embed="rId3"/>
+          <a:stretch>
+            <a:fillRect/>
+          </a:stretch>
+        </p:blipFill>
+        <p:spPr>
+          <a:xfrm>
+            <a:off x="2102152" y="1785195"/>
+            <a:ext cx="7984518" cy="4470297"/>
+          </a:xfrm>
+          <a:prstGeom prst="rect">
+            <a:avLst/>
+          </a:prstGeom>
+        </p:spPr>
+      </p:pic>
+      <p:pic>
+        <p:nvPicPr>
+          <p:cNvPr id="5" name="Picture 4">
+            <a:extLst>
+              <a:ext uri="{FF2B5EF4-FFF2-40B4-BE49-F238E27FC236}">
+                <a16:creationId xmlns:a16="http://schemas.microsoft.com/office/drawing/2014/main" id="{429E97B6-2F4E-4722-B00B-8B8B9F2FA8CD}"/>
+              </a:ext>
+            </a:extLst>
+          </p:cNvPr>
+          <p:cNvPicPr>
+            <a:picLocks noChangeAspect="1"/>
+          </p:cNvPicPr>
+          <p:nvPr/>
+        </p:nvPicPr>
+        <p:blipFill>
+          <a:blip r:embed="rId4"/>
+          <a:stretch>
+            <a:fillRect/>
+          </a:stretch>
+        </p:blipFill>
+        <p:spPr>
+          <a:xfrm>
+            <a:off x="3227894" y="3042443"/>
+            <a:ext cx="5733033" cy="1955800"/>
+          </a:xfrm>
+          <a:prstGeom prst="rect">
+            <a:avLst/>
+          </a:prstGeom>
+        </p:spPr>
+      </p:pic>
     </p:spTree>
     <p:extLst>
       <p:ext uri="{BB962C8B-B14F-4D97-AF65-F5344CB8AC3E}">
         <p14:creationId xmlns:p14="http://schemas.microsoft.com/office/powerpoint/2010/main" val="4119176485"/>
+      </p:ext>
+    </p:extLst>
+  </p:cSld>
+  <p:clrMapOvr>
+    <a:masterClrMapping/>
+  </p:clrMapOvr>
+  <p:timing>
+    <p:tnLst>
+      <p:par>
+        <p:cTn id="1" dur="indefinite" restart="never" nodeType="tmRoot">
+          <p:childTnLst>
+            <p:seq concurrent="1" nextAc="seek">
+              <p:cTn id="2" dur="indefinite" nodeType="mainSeq">
+                <p:childTnLst>
+                  <p:par>
+                    <p:cTn id="3" fill="hold">
+                      <p:stCondLst>
+                        <p:cond delay="indefinite"/>
+                      </p:stCondLst>
+                      <p:childTnLst>
+                        <p:par>
+                          <p:cTn id="4" fill="hold">
+                            <p:stCondLst>
+                              <p:cond delay="0"/>
+                            </p:stCondLst>
+                            <p:childTnLst>
+                              <p:par>
+                                <p:cTn id="5" presetID="1" presetClass="exit" presetSubtype="0" fill="hold" nodeType="clickEffect">
+                                  <p:stCondLst>
+                                    <p:cond delay="0"/>
+                                  </p:stCondLst>
+                                  <p:childTnLst>
+                                    <p:set>
+                                      <p:cBhvr>
+                                        <p:cTn id="6" dur="1" fill="hold">
+                                          <p:stCondLst>
+                                            <p:cond delay="0"/>
+                                          </p:stCondLst>
+                                        </p:cTn>
+                                        <p:tgtEl>
+                                          <p:spTgt spid="4"/>
+                                        </p:tgtEl>
+                                        <p:attrNameLst>
+                                          <p:attrName>style.visibility</p:attrName>
+                                        </p:attrNameLst>
+                                      </p:cBhvr>
+                                      <p:to>
+                                        <p:strVal val="hidden"/>
+                                      </p:to>
+                                    </p:set>
+                                  </p:childTnLst>
+                                </p:cTn>
+                              </p:par>
+                              <p:par>
+                                <p:cTn id="7" presetID="2" presetClass="entr" presetSubtype="4" fill="hold" nodeType="withEffect">
+                                  <p:stCondLst>
+                                    <p:cond delay="0"/>
+                                  </p:stCondLst>
+                                  <p:childTnLst>
+                                    <p:set>
+                                      <p:cBhvr>
+                                        <p:cTn id="8" dur="1" fill="hold">
+                                          <p:stCondLst>
+                                            <p:cond delay="0"/>
+                                          </p:stCondLst>
+                                        </p:cTn>
+                                        <p:tgtEl>
+                                          <p:spTgt spid="5"/>
+                                        </p:tgtEl>
+                                        <p:attrNameLst>
+                                          <p:attrName>style.visibility</p:attrName>
+                                        </p:attrNameLst>
+                                      </p:cBhvr>
+                                      <p:to>
+                                        <p:strVal val="visible"/>
+                                      </p:to>
+                                    </p:set>
+                                    <p:anim calcmode="lin" valueType="num">
+                                      <p:cBhvr additive="base">
+                                        <p:cTn id="9" dur="500" fill="hold"/>
+                                        <p:tgtEl>
+                                          <p:spTgt spid="5"/>
+                                        </p:tgtEl>
+                                        <p:attrNameLst>
+                                          <p:attrName>ppt_x</p:attrName>
+                                        </p:attrNameLst>
+                                      </p:cBhvr>
+                                      <p:tavLst>
+                                        <p:tav tm="0">
+                                          <p:val>
+                                            <p:strVal val="#ppt_x"/>
+                                          </p:val>
+                                        </p:tav>
+                                        <p:tav tm="100000">
+                                          <p:val>
+                                            <p:strVal val="#ppt_x"/>
+                                          </p:val>
+                                        </p:tav>
+                                      </p:tavLst>
+                                    </p:anim>
+                                    <p:anim calcmode="lin" valueType="num">
+                                      <p:cBhvr additive="base">
+                                        <p:cTn id="10" dur="500" fill="hold"/>
+                                        <p:tgtEl>
+                                          <p:spTgt spid="5"/>
+                                        </p:tgtEl>
+                                        <p:attrNameLst>
+                                          <p:attrName>ppt_y</p:attrName>
+                                        </p:attrNameLst>
+                                      </p:cBhvr>
+                                      <p:tavLst>
+                                        <p:tav tm="0">
+                                          <p:val>
+                                            <p:strVal val="1+#ppt_h/2"/>
+                                          </p:val>
+                                        </p:tav>
+                                        <p:tav tm="100000">
+                                          <p:val>
+                                            <p:strVal val="#ppt_y"/>
+                                          </p:val>
+                                        </p:tav>
+                                      </p:tavLst>
+                                    </p:anim>
+                                  </p:childTnLst>
+                                </p:cTn>
+                              </p:par>
+                            </p:childTnLst>
+                          </p:cTn>
+                        </p:par>
+                      </p:childTnLst>
+                    </p:cTn>
+                  </p:par>
+                </p:childTnLst>
+              </p:cTn>
+              <p:prevCondLst>
+                <p:cond evt="onPrev" delay="0">
+                  <p:tgtEl>
+                    <p:sldTgt/>
+                  </p:tgtEl>
+                </p:cond>
+              </p:prevCondLst>
+              <p:nextCondLst>
+                <p:cond evt="onNext" delay="0">
+                  <p:tgtEl>
+                    <p:sldTgt/>
+                  </p:tgtEl>
+                </p:cond>
+              </p:nextCondLst>
+            </p:seq>
+          </p:childTnLst>
+        </p:cTn>
+      </p:par>
+    </p:tnLst>
+  </p:timing>
+</p:sld>
+</file>
+
+<file path=ppt/slides/slide9.xml><?xml version="1.0" encoding="utf-8"?>
+<p:sld xmlns:a="http://schemas.openxmlformats.org/drawingml/2006/main" xmlns:r="http://schemas.openxmlformats.org/officeDocument/2006/relationships" xmlns:p="http://schemas.openxmlformats.org/presentationml/2006/main">
+  <p:cSld>
+    <p:spTree>
+      <p:nvGrpSpPr>
+        <p:cNvPr id="1" name=""/>
+        <p:cNvGrpSpPr/>
+        <p:nvPr/>
+      </p:nvGrpSpPr>
+      <p:grpSpPr>
+        <a:xfrm>
+          <a:off x="0" y="0"/>
+          <a:ext cx="0" cy="0"/>
+          <a:chOff x="0" y="0"/>
+          <a:chExt cx="0" cy="0"/>
+        </a:xfrm>
+      </p:grpSpPr>
+      <p:sp>
+        <p:nvSpPr>
+          <p:cNvPr id="2" name="Title 1">
+            <a:extLst>
+              <a:ext uri="{FF2B5EF4-FFF2-40B4-BE49-F238E27FC236}">
+                <a16:creationId xmlns:a16="http://schemas.microsoft.com/office/drawing/2014/main" id="{E39C28E2-9194-40CD-BFAE-7389B099D8AF}"/>
+              </a:ext>
+            </a:extLst>
+          </p:cNvPr>
+          <p:cNvSpPr>
+            <a:spLocks noGrp="1"/>
+          </p:cNvSpPr>
+          <p:nvPr>
+            <p:ph type="title"/>
+          </p:nvPr>
+        </p:nvSpPr>
+        <p:spPr/>
+        <p:txBody>
+          <a:bodyPr/>
+          <a:lstStyle/>
+          <a:p>
+            <a:r>
+              <a:rPr lang="es-ES" dirty="0" err="1"/>
+              <a:t>Wordpress</a:t>
+            </a:r>
+            <a:endParaRPr lang="en-US" dirty="0"/>
+          </a:p>
+        </p:txBody>
+      </p:sp>
+      <p:sp>
+        <p:nvSpPr>
+          <p:cNvPr id="3" name="Content Placeholder 2">
+            <a:extLst>
+              <a:ext uri="{FF2B5EF4-FFF2-40B4-BE49-F238E27FC236}">
+                <a16:creationId xmlns:a16="http://schemas.microsoft.com/office/drawing/2014/main" id="{DA79BC87-278A-4F1C-BFDE-928356348413}"/>
+              </a:ext>
+            </a:extLst>
+          </p:cNvPr>
+          <p:cNvSpPr>
+            <a:spLocks noGrp="1"/>
+          </p:cNvSpPr>
+          <p:nvPr>
+            <p:ph idx="1"/>
+          </p:nvPr>
+        </p:nvSpPr>
+        <p:spPr/>
+        <p:txBody>
+          <a:bodyPr/>
+          <a:lstStyle/>
+          <a:p>
+            <a:endParaRPr lang="en-US"/>
+          </a:p>
+        </p:txBody>
+      </p:sp>
+    </p:spTree>
+    <p:extLst>
+      <p:ext uri="{BB962C8B-B14F-4D97-AF65-F5344CB8AC3E}">
+        <p14:creationId xmlns:p14="http://schemas.microsoft.com/office/powerpoint/2010/main" val="3767124708"/>
       </p:ext>
     </p:extLst>
   </p:cSld>

</xml_diff>